<commit_message>
Ajout de la sécurisation des endpoints
</commit_message>
<xml_diff>
--- a/docs/Formation_Angular_002_Premiers-pas.pptx
+++ b/docs/Formation_Angular_002_Premiers-pas.pptx
@@ -5,10 +5,10 @@
     <p:sldMasterId id="2147483648" r:id="rId5"/>
   </p:sldMasterIdLst>
   <p:notesMasterIdLst>
-    <p:notesMasterId r:id="rId48"/>
+    <p:notesMasterId r:id="rId51"/>
   </p:notesMasterIdLst>
   <p:handoutMasterIdLst>
-    <p:handoutMasterId r:id="rId49"/>
+    <p:handoutMasterId r:id="rId52"/>
   </p:handoutMasterIdLst>
   <p:sldIdLst>
     <p:sldId id="315" r:id="rId6"/>
@@ -51,8 +51,11 @@
     <p:sldId id="420" r:id="rId43"/>
     <p:sldId id="421" r:id="rId44"/>
     <p:sldId id="422" r:id="rId45"/>
-    <p:sldId id="417" r:id="rId46"/>
-    <p:sldId id="366" r:id="rId47"/>
+    <p:sldId id="423" r:id="rId46"/>
+    <p:sldId id="424" r:id="rId47"/>
+    <p:sldId id="425" r:id="rId48"/>
+    <p:sldId id="417" r:id="rId49"/>
+    <p:sldId id="366" r:id="rId50"/>
   </p:sldIdLst>
   <p:sldSz cx="9144000" cy="6858000" type="screen4x3"/>
   <p:notesSz cx="6858000" cy="9144000"/>
@@ -321,7 +324,7 @@
                 <a:latin typeface="Arial" pitchFamily="34" charset="0"/>
               </a:rPr>
               <a:pPr/>
-              <a:t>22/11/2019</a:t>
+              <a:t>25/11/2019</a:t>
             </a:fld>
             <a:endParaRPr lang="en-GB" dirty="0">
               <a:latin typeface="Arial" pitchFamily="34" charset="0"/>
@@ -500,7 +503,7 @@
             <a:fld id="{B5D7A87D-1CDA-443F-BAE3-82C9C05446C3}" type="datetimeFigureOut">
               <a:rPr lang="en-GB" smtClean="0"/>
               <a:pPr/>
-              <a:t>22/11/2019</a:t>
+              <a:t>25/11/2019</a:t>
             </a:fld>
             <a:endParaRPr lang="en-GB" dirty="0"/>
           </a:p>
@@ -3889,6 +3892,42 @@
           </a:bodyPr>
           <a:lstStyle/>
           <a:p>
+            <a:r>
+              <a:rPr lang="en-GB" dirty="0" err="1" smtClean="0"/>
+              <a:t>UrlTree</a:t>
+            </a:r>
+            <a:r>
+              <a:rPr lang="en-GB" dirty="0" smtClean="0"/>
+              <a:t>:</a:t>
+            </a:r>
+            <a:r>
+              <a:rPr lang="en-GB" baseline="0" dirty="0" smtClean="0"/>
+              <a:t> </a:t>
+            </a:r>
+            <a:r>
+              <a:rPr lang="en-GB" baseline="0" dirty="0" err="1" smtClean="0"/>
+              <a:t>permet</a:t>
+            </a:r>
+            <a:r>
+              <a:rPr lang="en-GB" baseline="0" dirty="0" smtClean="0"/>
+              <a:t> la redirection </a:t>
+            </a:r>
+            <a:r>
+              <a:rPr lang="en-GB" baseline="0" dirty="0" err="1" smtClean="0"/>
+              <a:t>dans</a:t>
+            </a:r>
+            <a:r>
+              <a:rPr lang="en-GB" baseline="0" dirty="0" smtClean="0"/>
+              <a:t> le </a:t>
+            </a:r>
+            <a:r>
+              <a:rPr lang="en-GB" baseline="0" dirty="0" err="1" smtClean="0"/>
+              <a:t>processus</a:t>
+            </a:r>
+            <a:r>
+              <a:rPr lang="en-GB" baseline="0" dirty="0" smtClean="0"/>
+              <a:t> de navigation</a:t>
+            </a:r>
             <a:endParaRPr lang="en-GB" dirty="0"/>
           </a:p>
         </p:txBody>
@@ -3918,6 +3957,11 @@
         </p:txBody>
       </p:sp>
     </p:spTree>
+    <p:extLst>
+      <p:ext uri="{BB962C8B-B14F-4D97-AF65-F5344CB8AC3E}">
+        <p14:creationId xmlns:p14="http://schemas.microsoft.com/office/powerpoint/2010/main" val="1220900894"/>
+      </p:ext>
+    </p:extLst>
   </p:cSld>
   <p:clrMapOvr>
     <a:masterClrMapping/>
@@ -3993,7 +4037,176 @@
             <a:fld id="{20B9C825-F38E-45BB-92C1-043DE61C9183}" type="slidenum">
               <a:rPr lang="en-GB" smtClean="0"/>
               <a:pPr/>
-              <a:t>42</a:t>
+              <a:t>43</a:t>
+            </a:fld>
+            <a:endParaRPr lang="en-GB" dirty="0"/>
+          </a:p>
+        </p:txBody>
+      </p:sp>
+    </p:spTree>
+    <p:extLst>
+      <p:ext uri="{BB962C8B-B14F-4D97-AF65-F5344CB8AC3E}">
+        <p14:creationId xmlns:p14="http://schemas.microsoft.com/office/powerpoint/2010/main" val="3522482121"/>
+      </p:ext>
+    </p:extLst>
+  </p:cSld>
+  <p:clrMapOvr>
+    <a:masterClrMapping/>
+  </p:clrMapOvr>
+</p:notes>
+</file>
+
+<file path=ppt/notesSlides/notesSlide43.xml><?xml version="1.0" encoding="utf-8"?>
+<p:notes xmlns:a="http://schemas.openxmlformats.org/drawingml/2006/main" xmlns:r="http://schemas.openxmlformats.org/officeDocument/2006/relationships" xmlns:p="http://schemas.openxmlformats.org/presentationml/2006/main">
+  <p:cSld>
+    <p:spTree>
+      <p:nvGrpSpPr>
+        <p:cNvPr id="1" name=""/>
+        <p:cNvGrpSpPr/>
+        <p:nvPr/>
+      </p:nvGrpSpPr>
+      <p:grpSpPr>
+        <a:xfrm>
+          <a:off x="0" y="0"/>
+          <a:ext cx="0" cy="0"/>
+          <a:chOff x="0" y="0"/>
+          <a:chExt cx="0" cy="0"/>
+        </a:xfrm>
+      </p:grpSpPr>
+      <p:sp>
+        <p:nvSpPr>
+          <p:cNvPr id="2" name="Slide Image Placeholder 1"/>
+          <p:cNvSpPr>
+            <a:spLocks noGrp="1" noRot="1" noChangeAspect="1"/>
+          </p:cNvSpPr>
+          <p:nvPr>
+            <p:ph type="sldImg"/>
+          </p:nvPr>
+        </p:nvSpPr>
+        <p:spPr/>
+      </p:sp>
+      <p:sp>
+        <p:nvSpPr>
+          <p:cNvPr id="3" name="Notes Placeholder 2"/>
+          <p:cNvSpPr>
+            <a:spLocks noGrp="1"/>
+          </p:cNvSpPr>
+          <p:nvPr>
+            <p:ph type="body" idx="1"/>
+          </p:nvPr>
+        </p:nvSpPr>
+        <p:spPr/>
+        <p:txBody>
+          <a:bodyPr>
+            <a:normAutofit/>
+          </a:bodyPr>
+          <a:lstStyle/>
+          <a:p>
+            <a:endParaRPr lang="en-GB" dirty="0"/>
+          </a:p>
+        </p:txBody>
+      </p:sp>
+      <p:sp>
+        <p:nvSpPr>
+          <p:cNvPr id="4" name="Slide Number Placeholder 3"/>
+          <p:cNvSpPr>
+            <a:spLocks noGrp="1"/>
+          </p:cNvSpPr>
+          <p:nvPr>
+            <p:ph type="sldNum" sz="quarter" idx="10"/>
+          </p:nvPr>
+        </p:nvSpPr>
+        <p:spPr/>
+        <p:txBody>
+          <a:bodyPr/>
+          <a:lstStyle/>
+          <a:p>
+            <a:fld id="{20B9C825-F38E-45BB-92C1-043DE61C9183}" type="slidenum">
+              <a:rPr lang="en-GB" smtClean="0"/>
+              <a:pPr/>
+              <a:t>44</a:t>
+            </a:fld>
+            <a:endParaRPr lang="en-GB" dirty="0"/>
+          </a:p>
+        </p:txBody>
+      </p:sp>
+    </p:spTree>
+  </p:cSld>
+  <p:clrMapOvr>
+    <a:masterClrMapping/>
+  </p:clrMapOvr>
+</p:notes>
+</file>
+
+<file path=ppt/notesSlides/notesSlide44.xml><?xml version="1.0" encoding="utf-8"?>
+<p:notes xmlns:a="http://schemas.openxmlformats.org/drawingml/2006/main" xmlns:r="http://schemas.openxmlformats.org/officeDocument/2006/relationships" xmlns:p="http://schemas.openxmlformats.org/presentationml/2006/main">
+  <p:cSld>
+    <p:spTree>
+      <p:nvGrpSpPr>
+        <p:cNvPr id="1" name=""/>
+        <p:cNvGrpSpPr/>
+        <p:nvPr/>
+      </p:nvGrpSpPr>
+      <p:grpSpPr>
+        <a:xfrm>
+          <a:off x="0" y="0"/>
+          <a:ext cx="0" cy="0"/>
+          <a:chOff x="0" y="0"/>
+          <a:chExt cx="0" cy="0"/>
+        </a:xfrm>
+      </p:grpSpPr>
+      <p:sp>
+        <p:nvSpPr>
+          <p:cNvPr id="2" name="Slide Image Placeholder 1"/>
+          <p:cNvSpPr>
+            <a:spLocks noGrp="1" noRot="1" noChangeAspect="1"/>
+          </p:cNvSpPr>
+          <p:nvPr>
+            <p:ph type="sldImg"/>
+          </p:nvPr>
+        </p:nvSpPr>
+        <p:spPr/>
+      </p:sp>
+      <p:sp>
+        <p:nvSpPr>
+          <p:cNvPr id="3" name="Notes Placeholder 2"/>
+          <p:cNvSpPr>
+            <a:spLocks noGrp="1"/>
+          </p:cNvSpPr>
+          <p:nvPr>
+            <p:ph type="body" idx="1"/>
+          </p:nvPr>
+        </p:nvSpPr>
+        <p:spPr/>
+        <p:txBody>
+          <a:bodyPr>
+            <a:normAutofit/>
+          </a:bodyPr>
+          <a:lstStyle/>
+          <a:p>
+            <a:endParaRPr lang="en-GB" dirty="0"/>
+          </a:p>
+        </p:txBody>
+      </p:sp>
+      <p:sp>
+        <p:nvSpPr>
+          <p:cNvPr id="4" name="Slide Number Placeholder 3"/>
+          <p:cNvSpPr>
+            <a:spLocks noGrp="1"/>
+          </p:cNvSpPr>
+          <p:nvPr>
+            <p:ph type="sldNum" sz="quarter" idx="10"/>
+          </p:nvPr>
+        </p:nvSpPr>
+        <p:spPr/>
+        <p:txBody>
+          <a:bodyPr/>
+          <a:lstStyle/>
+          <a:p>
+            <a:fld id="{20B9C825-F38E-45BB-92C1-043DE61C9183}" type="slidenum">
+              <a:rPr lang="en-GB" smtClean="0"/>
+              <a:pPr/>
+              <a:t>45</a:t>
             </a:fld>
             <a:endParaRPr lang="en-GB" dirty="0"/>
           </a:p>
@@ -37928,7 +38141,7 @@
         <p:spPr>
           <a:xfrm>
             <a:off x="452283" y="1690304"/>
-            <a:ext cx="8190272" cy="3078341"/>
+            <a:ext cx="8190272" cy="3392059"/>
           </a:xfrm>
           <a:solidFill>
             <a:schemeClr val="tx1">
@@ -38386,8 +38599,34 @@
                 </a:solidFill>
                 <a:latin typeface="Consolas" pitchFamily="49" charset="0"/>
               </a:rPr>
-              <a:t>  }</a:t>
-            </a:r>
+              <a:t>  </a:t>
+            </a:r>
+            <a:r>
+              <a:rPr lang="fr-FR" sz="1600" dirty="0" smtClean="0">
+                <a:solidFill>
+                  <a:schemeClr val="bg1"/>
+                </a:solidFill>
+                <a:latin typeface="Consolas" pitchFamily="49" charset="0"/>
+              </a:rPr>
+              <a:t>}</a:t>
+            </a:r>
+          </a:p>
+          <a:p>
+            <a:r>
+              <a:rPr lang="fr-FR" sz="1600" dirty="0">
+                <a:solidFill>
+                  <a:schemeClr val="bg1"/>
+                </a:solidFill>
+                <a:latin typeface="Consolas" pitchFamily="49" charset="0"/>
+              </a:rPr>
+              <a:t>}</a:t>
+            </a:r>
+            <a:endParaRPr lang="fr-FR" sz="1600" dirty="0">
+              <a:solidFill>
+                <a:schemeClr val="bg1"/>
+              </a:solidFill>
+              <a:latin typeface="Consolas" pitchFamily="49" charset="0"/>
+            </a:endParaRPr>
           </a:p>
         </p:txBody>
       </p:sp>
@@ -38447,8 +38686,8 @@
           <a:lstStyle/>
           <a:p>
             <a:r>
-              <a:rPr lang="fr-CA" dirty="0" smtClean="0"/>
-              <a:t>TP #3</a:t>
+              <a:rPr lang="fr-FR" dirty="0" err="1" smtClean="0"/>
+              <a:t>Routing</a:t>
             </a:r>
             <a:endParaRPr lang="fr-CA" dirty="0"/>
           </a:p>
@@ -38456,7 +38695,7 @@
       </p:sp>
       <p:sp>
         <p:nvSpPr>
-          <p:cNvPr id="6" name="Espace réservé du contenu 5"/>
+          <p:cNvPr id="3" name="Espace réservé du contenu 2"/>
           <p:cNvSpPr>
             <a:spLocks noGrp="1"/>
           </p:cNvSpPr>
@@ -38470,141 +38709,76 @@
           <a:lstStyle/>
           <a:p>
             <a:pPr marL="342900" indent="-342900">
-              <a:buFont typeface="Arial" pitchFamily="34" charset="0"/>
+              <a:buFont typeface="Arial" panose="020B0604020202020204" pitchFamily="34" charset="0"/>
               <a:buChar char="•"/>
             </a:pPr>
             <a:r>
               <a:rPr lang="fr-FR" dirty="0" smtClean="0"/>
-              <a:t>Récupérer la branche tp3 sur Git </a:t>
-            </a:r>
+              <a:t>On peut sécuriser l’accès à certaines routes grâce au mécanisme de </a:t>
+            </a:r>
+            <a:r>
+              <a:rPr lang="fr-FR" dirty="0" err="1" smtClean="0"/>
+              <a:t>Guard</a:t>
+            </a:r>
+            <a:endParaRPr lang="fr-FR" dirty="0" smtClean="0"/>
           </a:p>
           <a:p>
             <a:pPr marL="342900" indent="-342900">
-              <a:buFont typeface="Arial" pitchFamily="34" charset="0"/>
+              <a:buFont typeface="Arial" panose="020B0604020202020204" pitchFamily="34" charset="0"/>
               <a:buChar char="•"/>
             </a:pPr>
             <a:endParaRPr lang="fr-FR" dirty="0"/>
           </a:p>
           <a:p>
             <a:pPr marL="342900" indent="-342900">
-              <a:buFont typeface="Arial" pitchFamily="34" charset="0"/>
+              <a:buFont typeface="Arial" panose="020B0604020202020204" pitchFamily="34" charset="0"/>
               <a:buChar char="•"/>
             </a:pPr>
             <a:r>
               <a:rPr lang="fr-FR" dirty="0" smtClean="0"/>
-              <a:t>Consignes:</a:t>
+              <a:t>Retours possibles:</a:t>
             </a:r>
           </a:p>
           <a:p>
             <a:pPr marL="606425" lvl="1" indent="-342900"/>
             <a:r>
               <a:rPr lang="fr-FR" dirty="0" smtClean="0"/>
-              <a:t>Créer un service permettant de récupérer la liste de tous les joueurs</a:t>
-            </a:r>
-            <a:r>
-              <a:rPr lang="fr-FR" dirty="0"/>
-              <a:t>, un joueur depuis son </a:t>
-            </a:r>
+              <a:t>Vrai</a:t>
+            </a:r>
+          </a:p>
+          <a:p>
+            <a:pPr marL="606425" lvl="1" indent="-342900"/>
             <a:r>
               <a:rPr lang="fr-FR" dirty="0" smtClean="0"/>
-              <a:t>id, la liste de toutes les équipes et une équipe depuis son id</a:t>
+              <a:t>Faux</a:t>
             </a:r>
           </a:p>
           <a:p>
             <a:pPr marL="606425" lvl="1" indent="-342900"/>
             <a:r>
-              <a:rPr lang="fr-FR" dirty="0" smtClean="0"/>
-              <a:t>Injecter ce service dans le composant </a:t>
-            </a:r>
-            <a:r>
-              <a:rPr lang="fr-FR" i="1" dirty="0" smtClean="0"/>
-              <a:t>tp3</a:t>
-            </a:r>
-            <a:r>
-              <a:rPr lang="fr-FR" dirty="0" smtClean="0"/>
-              <a:t> et dans le composant </a:t>
-            </a:r>
-            <a:r>
-              <a:rPr lang="fr-FR" i="1" dirty="0" err="1" smtClean="0"/>
-              <a:t>player</a:t>
-            </a:r>
-            <a:endParaRPr lang="fr-FR" i="1" dirty="0" smtClean="0"/>
-          </a:p>
-          <a:p>
-            <a:pPr marL="606425" lvl="1" indent="-342900"/>
-            <a:r>
-              <a:rPr lang="fr-FR" dirty="0" smtClean="0"/>
-              <a:t>Injecter ce service dans le Pipe </a:t>
-            </a:r>
-            <a:r>
-              <a:rPr lang="fr-FR" i="1" dirty="0" err="1" smtClean="0"/>
-              <a:t>get</a:t>
-            </a:r>
-            <a:r>
-              <a:rPr lang="fr-FR" i="1" dirty="0" smtClean="0"/>
-              <a:t>-team</a:t>
-            </a:r>
-          </a:p>
-          <a:p>
-            <a:pPr marL="606425" lvl="1" indent="-342900"/>
-            <a:r>
-              <a:rPr lang="fr-FR" dirty="0" smtClean="0"/>
-              <a:t>Créer les routes permettant d’accéder aux composants </a:t>
-            </a:r>
-            <a:r>
-              <a:rPr lang="fr-FR" i="1" dirty="0" smtClean="0"/>
-              <a:t>tp3</a:t>
-            </a:r>
-            <a:r>
-              <a:rPr lang="fr-FR" dirty="0" smtClean="0"/>
-              <a:t> et </a:t>
-            </a:r>
-            <a:r>
-              <a:rPr lang="fr-FR" i="1" dirty="0" err="1" smtClean="0"/>
-              <a:t>player</a:t>
-            </a:r>
-            <a:r>
-              <a:rPr lang="fr-FR" i="1" dirty="0" smtClean="0"/>
-              <a:t> </a:t>
-            </a:r>
-            <a:r>
-              <a:rPr lang="fr-FR" dirty="0" smtClean="0"/>
-              <a:t>(avec en paramètre l’id du joueur)</a:t>
-            </a:r>
-          </a:p>
-          <a:p>
-            <a:pPr marL="606425" lvl="1" indent="-342900"/>
-            <a:r>
-              <a:rPr lang="fr-FR" dirty="0" smtClean="0"/>
-              <a:t>Ajouter les routes au module de </a:t>
-            </a:r>
-            <a:r>
               <a:rPr lang="fr-FR" dirty="0" err="1" smtClean="0"/>
-              <a:t>routing</a:t>
-            </a:r>
+              <a:t>UrlTree</a:t>
+            </a:r>
+            <a:endParaRPr lang="fr-FR" dirty="0"/>
+          </a:p>
+          <a:p>
+            <a:pPr lvl="1" indent="0">
+              <a:buNone/>
+            </a:pPr>
             <a:endParaRPr lang="fr-FR" dirty="0" smtClean="0"/>
           </a:p>
           <a:p>
-            <a:pPr marL="606425" lvl="1" indent="-342900"/>
-            <a:r>
-              <a:rPr lang="fr-FR" dirty="0" smtClean="0"/>
-              <a:t>Modifier le tableau pour rediriger le clic sur le lien vers le composant </a:t>
-            </a:r>
-            <a:r>
-              <a:rPr lang="fr-FR" i="1" dirty="0" err="1" smtClean="0"/>
-              <a:t>player</a:t>
-            </a:r>
-            <a:r>
-              <a:rPr lang="fr-FR" dirty="0" smtClean="0"/>
-              <a:t> avec l’identifiant du joueur</a:t>
-            </a:r>
-            <a:r>
-              <a:rPr lang="fr-FR" i="1" dirty="0" smtClean="0"/>
-              <a:t> </a:t>
-            </a:r>
-          </a:p>
-          <a:p>
-            <a:pPr marL="606425" lvl="1" indent="-342900"/>
+            <a:pPr marL="342900" indent="-342900"/>
+            <a:endParaRPr lang="fr-FR" dirty="0" smtClean="0"/>
+          </a:p>
+          <a:p>
+            <a:pPr marL="342900" indent="-342900">
+              <a:buFont typeface="Arial" panose="020B0604020202020204" pitchFamily="34" charset="0"/>
+              <a:buChar char="•"/>
+            </a:pPr>
+            <a:endParaRPr lang="fr-FR" dirty="0"/>
+          </a:p>
+          <a:p>
             <a:endParaRPr lang="fr-FR" dirty="0"/>
           </a:p>
         </p:txBody>
@@ -38631,6 +38805,1628 @@
               <a:rPr lang="en-GB" smtClean="0"/>
               <a:pPr/>
               <a:t>41</a:t>
+            </a:fld>
+            <a:endParaRPr lang="en-GB" dirty="0"/>
+          </a:p>
+        </p:txBody>
+      </p:sp>
+    </p:spTree>
+    <p:extLst>
+      <p:ext uri="{BB962C8B-B14F-4D97-AF65-F5344CB8AC3E}">
+        <p14:creationId xmlns:p14="http://schemas.microsoft.com/office/powerpoint/2010/main" val="2881851185"/>
+      </p:ext>
+    </p:extLst>
+  </p:cSld>
+  <p:clrMapOvr>
+    <a:masterClrMapping/>
+  </p:clrMapOvr>
+  <p:timing>
+    <p:tnLst>
+      <p:par>
+        <p:cTn id="1" dur="indefinite" restart="never" nodeType="tmRoot"/>
+      </p:par>
+    </p:tnLst>
+  </p:timing>
+</p:sld>
+</file>
+
+<file path=ppt/slides/slide42.xml><?xml version="1.0" encoding="utf-8"?>
+<p:sld xmlns:a="http://schemas.openxmlformats.org/drawingml/2006/main" xmlns:r="http://schemas.openxmlformats.org/officeDocument/2006/relationships" xmlns:p="http://schemas.openxmlformats.org/presentationml/2006/main">
+  <p:cSld>
+    <p:spTree>
+      <p:nvGrpSpPr>
+        <p:cNvPr id="1" name=""/>
+        <p:cNvGrpSpPr/>
+        <p:nvPr/>
+      </p:nvGrpSpPr>
+      <p:grpSpPr>
+        <a:xfrm>
+          <a:off x="0" y="0"/>
+          <a:ext cx="0" cy="0"/>
+          <a:chOff x="0" y="0"/>
+          <a:chExt cx="0" cy="0"/>
+        </a:xfrm>
+      </p:grpSpPr>
+      <p:sp>
+        <p:nvSpPr>
+          <p:cNvPr id="2" name="Titre 1"/>
+          <p:cNvSpPr>
+            <a:spLocks noGrp="1"/>
+          </p:cNvSpPr>
+          <p:nvPr>
+            <p:ph type="title"/>
+          </p:nvPr>
+        </p:nvSpPr>
+        <p:spPr/>
+        <p:txBody>
+          <a:bodyPr/>
+          <a:lstStyle/>
+          <a:p>
+            <a:r>
+              <a:rPr lang="fr-FR" dirty="0" err="1" smtClean="0"/>
+              <a:t>Routing</a:t>
+            </a:r>
+            <a:endParaRPr lang="fr-FR" dirty="0"/>
+          </a:p>
+        </p:txBody>
+      </p:sp>
+      <p:sp>
+        <p:nvSpPr>
+          <p:cNvPr id="4" name="Espace réservé du numéro de diapositive 3"/>
+          <p:cNvSpPr>
+            <a:spLocks noGrp="1"/>
+          </p:cNvSpPr>
+          <p:nvPr>
+            <p:ph type="sldNum" sz="quarter" idx="12"/>
+          </p:nvPr>
+        </p:nvSpPr>
+        <p:spPr/>
+        <p:txBody>
+          <a:bodyPr/>
+          <a:lstStyle/>
+          <a:p>
+            <a:fld id="{525A3C56-E491-49B2-93F3-63532DF516BC}" type="slidenum">
+              <a:rPr lang="en-GB" smtClean="0"/>
+              <a:pPr/>
+              <a:t>42</a:t>
+            </a:fld>
+            <a:endParaRPr lang="en-GB" dirty="0"/>
+          </a:p>
+        </p:txBody>
+      </p:sp>
+      <p:sp>
+        <p:nvSpPr>
+          <p:cNvPr id="5" name="ZoneTexte 4"/>
+          <p:cNvSpPr txBox="1"/>
+          <p:nvPr/>
+        </p:nvSpPr>
+        <p:spPr bwMode="auto">
+          <a:xfrm>
+            <a:off x="447676" y="1216913"/>
+            <a:ext cx="3972232" cy="276999"/>
+          </a:xfrm>
+          <a:prstGeom prst="rect">
+            <a:avLst/>
+          </a:prstGeom>
+          <a:noFill/>
+          <a:ln w="9525" algn="ctr">
+            <a:noFill/>
+            <a:miter lim="800000"/>
+            <a:headEnd/>
+            <a:tailEnd/>
+          </a:ln>
+          <a:effectLst/>
+        </p:spPr>
+        <p:txBody>
+          <a:bodyPr wrap="square" lIns="0" tIns="0" rIns="0" bIns="0" rtlCol="0">
+            <a:spAutoFit/>
+          </a:bodyPr>
+          <a:lstStyle/>
+          <a:p>
+            <a:r>
+              <a:rPr lang="fr-FR" dirty="0" err="1" smtClean="0">
+                <a:cs typeface="Arial" pitchFamily="34" charset="0"/>
+              </a:rPr>
+              <a:t>auth.guard.ts</a:t>
+            </a:r>
+            <a:endParaRPr lang="fr-FR" dirty="0" smtClean="0">
+              <a:cs typeface="Arial" pitchFamily="34" charset="0"/>
+            </a:endParaRPr>
+          </a:p>
+        </p:txBody>
+      </p:sp>
+      <p:sp>
+        <p:nvSpPr>
+          <p:cNvPr id="6" name="Espace réservé du contenu 1"/>
+          <p:cNvSpPr>
+            <a:spLocks noGrp="1"/>
+          </p:cNvSpPr>
+          <p:nvPr>
+            <p:ph sz="quarter" idx="17"/>
+          </p:nvPr>
+        </p:nvSpPr>
+        <p:spPr>
+          <a:xfrm>
+            <a:off x="447674" y="1594611"/>
+            <a:ext cx="8239125" cy="4019380"/>
+          </a:xfrm>
+          <a:solidFill>
+            <a:schemeClr val="tx1">
+              <a:lumMod val="75000"/>
+            </a:schemeClr>
+          </a:solidFill>
+        </p:spPr>
+        <p:txBody>
+          <a:bodyPr>
+            <a:normAutofit lnSpcReduction="10000"/>
+          </a:bodyPr>
+          <a:lstStyle/>
+          <a:p>
+            <a:r>
+              <a:rPr lang="fr-FR" sz="1600" dirty="0">
+                <a:solidFill>
+                  <a:srgbClr val="92D050"/>
+                </a:solidFill>
+                <a:latin typeface="Consolas" pitchFamily="49" charset="0"/>
+              </a:rPr>
+              <a:t>@Injectable</a:t>
+            </a:r>
+            <a:r>
+              <a:rPr lang="fr-FR" sz="1600" dirty="0" smtClean="0">
+                <a:solidFill>
+                  <a:schemeClr val="bg1"/>
+                </a:solidFill>
+                <a:latin typeface="Consolas" pitchFamily="49" charset="0"/>
+              </a:rPr>
+              <a:t>()</a:t>
+            </a:r>
+            <a:endParaRPr lang="fr-FR" sz="1600" dirty="0">
+              <a:solidFill>
+                <a:schemeClr val="bg1"/>
+              </a:solidFill>
+              <a:latin typeface="Consolas" pitchFamily="49" charset="0"/>
+            </a:endParaRPr>
+          </a:p>
+          <a:p>
+            <a:r>
+              <a:rPr lang="fr-FR" sz="1600" b="1" dirty="0">
+                <a:solidFill>
+                  <a:srgbClr val="7030A0"/>
+                </a:solidFill>
+                <a:latin typeface="Consolas" pitchFamily="49" charset="0"/>
+              </a:rPr>
+              <a:t>export</a:t>
+            </a:r>
+            <a:r>
+              <a:rPr lang="fr-FR" sz="1600" dirty="0">
+                <a:solidFill>
+                  <a:schemeClr val="bg1"/>
+                </a:solidFill>
+                <a:latin typeface="Consolas" pitchFamily="49" charset="0"/>
+              </a:rPr>
+              <a:t> </a:t>
+            </a:r>
+            <a:r>
+              <a:rPr lang="fr-FR" sz="1600" dirty="0">
+                <a:solidFill>
+                  <a:srgbClr val="0070C0"/>
+                </a:solidFill>
+                <a:latin typeface="Consolas" pitchFamily="49" charset="0"/>
+              </a:rPr>
+              <a:t>class</a:t>
+            </a:r>
+            <a:r>
+              <a:rPr lang="fr-FR" sz="1600" dirty="0">
+                <a:solidFill>
+                  <a:schemeClr val="bg1"/>
+                </a:solidFill>
+                <a:latin typeface="Consolas" pitchFamily="49" charset="0"/>
+              </a:rPr>
+              <a:t> </a:t>
+            </a:r>
+            <a:r>
+              <a:rPr lang="fr-FR" sz="1600" dirty="0" err="1">
+                <a:solidFill>
+                  <a:srgbClr val="00B0F0"/>
+                </a:solidFill>
+                <a:latin typeface="Consolas" pitchFamily="49" charset="0"/>
+              </a:rPr>
+              <a:t>AuthGuard</a:t>
+            </a:r>
+            <a:r>
+              <a:rPr lang="fr-FR" sz="1600" dirty="0">
+                <a:solidFill>
+                  <a:schemeClr val="bg1"/>
+                </a:solidFill>
+                <a:latin typeface="Consolas" pitchFamily="49" charset="0"/>
+              </a:rPr>
+              <a:t> </a:t>
+            </a:r>
+            <a:r>
+              <a:rPr lang="fr-FR" sz="1600" dirty="0" err="1">
+                <a:solidFill>
+                  <a:srgbClr val="0070C0"/>
+                </a:solidFill>
+                <a:latin typeface="Consolas" pitchFamily="49" charset="0"/>
+              </a:rPr>
+              <a:t>implements</a:t>
+            </a:r>
+            <a:r>
+              <a:rPr lang="fr-FR" sz="1600" dirty="0">
+                <a:solidFill>
+                  <a:schemeClr val="bg1"/>
+                </a:solidFill>
+                <a:latin typeface="Consolas" pitchFamily="49" charset="0"/>
+              </a:rPr>
+              <a:t> </a:t>
+            </a:r>
+            <a:r>
+              <a:rPr lang="fr-FR" sz="1600" dirty="0" err="1">
+                <a:solidFill>
+                  <a:srgbClr val="00B0F0"/>
+                </a:solidFill>
+                <a:latin typeface="Consolas" pitchFamily="49" charset="0"/>
+              </a:rPr>
+              <a:t>CanActivate</a:t>
+            </a:r>
+            <a:r>
+              <a:rPr lang="fr-FR" sz="1600" dirty="0">
+                <a:solidFill>
+                  <a:schemeClr val="bg1"/>
+                </a:solidFill>
+                <a:latin typeface="Consolas" pitchFamily="49" charset="0"/>
+              </a:rPr>
+              <a:t> </a:t>
+            </a:r>
+            <a:r>
+              <a:rPr lang="fr-FR" sz="1600" dirty="0" smtClean="0">
+                <a:solidFill>
+                  <a:schemeClr val="bg1"/>
+                </a:solidFill>
+                <a:latin typeface="Consolas" pitchFamily="49" charset="0"/>
+              </a:rPr>
+              <a:t>{</a:t>
+            </a:r>
+          </a:p>
+          <a:p>
+            <a:endParaRPr lang="fr-FR" sz="1600" dirty="0">
+              <a:solidFill>
+                <a:schemeClr val="bg1"/>
+              </a:solidFill>
+              <a:latin typeface="Consolas" pitchFamily="49" charset="0"/>
+            </a:endParaRPr>
+          </a:p>
+          <a:p>
+            <a:r>
+              <a:rPr lang="fr-FR" sz="1600" dirty="0" smtClean="0">
+                <a:solidFill>
+                  <a:schemeClr val="bg1"/>
+                </a:solidFill>
+                <a:latin typeface="Consolas" pitchFamily="49" charset="0"/>
+              </a:rPr>
+              <a:t>  </a:t>
+            </a:r>
+            <a:r>
+              <a:rPr lang="fr-FR" sz="1600" dirty="0" err="1" smtClean="0">
+                <a:solidFill>
+                  <a:srgbClr val="0070C0"/>
+                </a:solidFill>
+                <a:latin typeface="Consolas" pitchFamily="49" charset="0"/>
+              </a:rPr>
+              <a:t>constructor</a:t>
+            </a:r>
+            <a:r>
+              <a:rPr lang="fr-FR" sz="1600" dirty="0" smtClean="0">
+                <a:solidFill>
+                  <a:schemeClr val="bg1"/>
+                </a:solidFill>
+                <a:latin typeface="Consolas" pitchFamily="49" charset="0"/>
+              </a:rPr>
+              <a:t>(</a:t>
+            </a:r>
+            <a:r>
+              <a:rPr lang="fr-FR" sz="1600" dirty="0" err="1" smtClean="0">
+                <a:solidFill>
+                  <a:srgbClr val="0070C0"/>
+                </a:solidFill>
+                <a:latin typeface="Consolas" pitchFamily="49" charset="0"/>
+              </a:rPr>
+              <a:t>private</a:t>
+            </a:r>
+            <a:r>
+              <a:rPr lang="fr-FR" sz="1600" dirty="0" smtClean="0">
+                <a:solidFill>
+                  <a:schemeClr val="bg1"/>
+                </a:solidFill>
+                <a:latin typeface="Consolas" pitchFamily="49" charset="0"/>
+              </a:rPr>
+              <a:t> </a:t>
+            </a:r>
+            <a:r>
+              <a:rPr lang="fr-FR" sz="1600" dirty="0" err="1">
+                <a:solidFill>
+                  <a:srgbClr val="00B0F0"/>
+                </a:solidFill>
+                <a:latin typeface="Consolas" pitchFamily="49" charset="0"/>
+              </a:rPr>
+              <a:t>authService</a:t>
+            </a:r>
+            <a:r>
+              <a:rPr lang="fr-FR" sz="1600" dirty="0">
+                <a:solidFill>
+                  <a:schemeClr val="bg1"/>
+                </a:solidFill>
+                <a:latin typeface="Consolas" pitchFamily="49" charset="0"/>
+              </a:rPr>
+              <a:t>: </a:t>
+            </a:r>
+            <a:r>
+              <a:rPr lang="fr-FR" sz="1600" dirty="0" err="1">
+                <a:solidFill>
+                  <a:srgbClr val="92D050"/>
+                </a:solidFill>
+                <a:latin typeface="Consolas" pitchFamily="49" charset="0"/>
+              </a:rPr>
+              <a:t>AuthService</a:t>
+            </a:r>
+            <a:r>
+              <a:rPr lang="fr-FR" sz="1600" dirty="0">
+                <a:solidFill>
+                  <a:schemeClr val="bg1"/>
+                </a:solidFill>
+                <a:latin typeface="Consolas" pitchFamily="49" charset="0"/>
+              </a:rPr>
+              <a:t>, </a:t>
+            </a:r>
+            <a:r>
+              <a:rPr lang="fr-FR" sz="1600" dirty="0" err="1">
+                <a:solidFill>
+                  <a:srgbClr val="0070C0"/>
+                </a:solidFill>
+                <a:latin typeface="Consolas" pitchFamily="49" charset="0"/>
+              </a:rPr>
+              <a:t>private</a:t>
+            </a:r>
+            <a:r>
+              <a:rPr lang="fr-FR" sz="1600" dirty="0">
+                <a:solidFill>
+                  <a:schemeClr val="bg1"/>
+                </a:solidFill>
+                <a:latin typeface="Consolas" pitchFamily="49" charset="0"/>
+              </a:rPr>
+              <a:t> </a:t>
+            </a:r>
+            <a:r>
+              <a:rPr lang="fr-FR" sz="1600" dirty="0">
+                <a:solidFill>
+                  <a:srgbClr val="00B0F0"/>
+                </a:solidFill>
+                <a:latin typeface="Consolas" pitchFamily="49" charset="0"/>
+              </a:rPr>
+              <a:t>router</a:t>
+            </a:r>
+            <a:r>
+              <a:rPr lang="fr-FR" sz="1600" dirty="0">
+                <a:solidFill>
+                  <a:schemeClr val="bg1"/>
+                </a:solidFill>
+                <a:latin typeface="Consolas" pitchFamily="49" charset="0"/>
+              </a:rPr>
+              <a:t>: </a:t>
+            </a:r>
+            <a:r>
+              <a:rPr lang="fr-FR" sz="1600" dirty="0">
+                <a:solidFill>
+                  <a:srgbClr val="92D050"/>
+                </a:solidFill>
+                <a:latin typeface="Consolas" pitchFamily="49" charset="0"/>
+              </a:rPr>
+              <a:t>Router</a:t>
+            </a:r>
+            <a:r>
+              <a:rPr lang="fr-FR" sz="1600" dirty="0">
+                <a:solidFill>
+                  <a:schemeClr val="bg1"/>
+                </a:solidFill>
+                <a:latin typeface="Consolas" pitchFamily="49" charset="0"/>
+              </a:rPr>
+              <a:t>) </a:t>
+            </a:r>
+            <a:r>
+              <a:rPr lang="fr-FR" sz="1600" dirty="0" smtClean="0">
+                <a:solidFill>
+                  <a:schemeClr val="bg1"/>
+                </a:solidFill>
+                <a:latin typeface="Consolas" pitchFamily="49" charset="0"/>
+              </a:rPr>
+              <a:t>{}</a:t>
+            </a:r>
+          </a:p>
+          <a:p>
+            <a:endParaRPr lang="fr-FR" sz="1600" dirty="0">
+              <a:solidFill>
+                <a:schemeClr val="bg1"/>
+              </a:solidFill>
+              <a:latin typeface="Consolas" pitchFamily="49" charset="0"/>
+            </a:endParaRPr>
+          </a:p>
+          <a:p>
+            <a:r>
+              <a:rPr lang="fr-FR" sz="1600" dirty="0">
+                <a:solidFill>
+                  <a:schemeClr val="bg1"/>
+                </a:solidFill>
+                <a:latin typeface="Consolas" pitchFamily="49" charset="0"/>
+              </a:rPr>
+              <a:t>  </a:t>
+            </a:r>
+            <a:r>
+              <a:rPr lang="fr-FR" sz="1600" dirty="0" err="1" smtClean="0">
+                <a:solidFill>
+                  <a:srgbClr val="D8F141"/>
+                </a:solidFill>
+                <a:latin typeface="Consolas" pitchFamily="49" charset="0"/>
+              </a:rPr>
+              <a:t>canActivate</a:t>
+            </a:r>
+            <a:r>
+              <a:rPr lang="fr-FR" sz="1600" dirty="0" smtClean="0">
+                <a:solidFill>
+                  <a:schemeClr val="bg1"/>
+                </a:solidFill>
+                <a:latin typeface="Consolas" pitchFamily="49" charset="0"/>
+              </a:rPr>
+              <a:t>(): </a:t>
+            </a:r>
+            <a:r>
+              <a:rPr lang="fr-FR" sz="1600" dirty="0" err="1">
+                <a:solidFill>
+                  <a:srgbClr val="92D050"/>
+                </a:solidFill>
+                <a:latin typeface="Consolas" pitchFamily="49" charset="0"/>
+              </a:rPr>
+              <a:t>boolean</a:t>
+            </a:r>
+            <a:r>
+              <a:rPr lang="fr-FR" sz="1600" dirty="0">
+                <a:solidFill>
+                  <a:schemeClr val="bg1"/>
+                </a:solidFill>
+                <a:latin typeface="Consolas" pitchFamily="49" charset="0"/>
+              </a:rPr>
+              <a:t> </a:t>
+            </a:r>
+            <a:r>
+              <a:rPr lang="fr-FR" sz="1600" dirty="0" smtClean="0">
+                <a:solidFill>
+                  <a:schemeClr val="bg1"/>
+                </a:solidFill>
+                <a:latin typeface="Consolas" pitchFamily="49" charset="0"/>
+              </a:rPr>
+              <a:t>{</a:t>
+            </a:r>
+          </a:p>
+          <a:p>
+            <a:r>
+              <a:rPr lang="fr-FR" sz="1600" dirty="0" smtClean="0">
+                <a:solidFill>
+                  <a:schemeClr val="bg1"/>
+                </a:solidFill>
+                <a:latin typeface="Consolas" pitchFamily="49" charset="0"/>
+              </a:rPr>
+              <a:t>    </a:t>
+            </a:r>
+            <a:r>
+              <a:rPr lang="fr-FR" sz="1600" dirty="0" smtClean="0">
+                <a:solidFill>
+                  <a:srgbClr val="7030A0"/>
+                </a:solidFill>
+                <a:latin typeface="Consolas" pitchFamily="49" charset="0"/>
+              </a:rPr>
+              <a:t>if</a:t>
+            </a:r>
+            <a:r>
+              <a:rPr lang="fr-FR" sz="1600" dirty="0" smtClean="0">
+                <a:solidFill>
+                  <a:schemeClr val="bg1"/>
+                </a:solidFill>
+                <a:latin typeface="Consolas" pitchFamily="49" charset="0"/>
+              </a:rPr>
+              <a:t> (</a:t>
+            </a:r>
+            <a:r>
+              <a:rPr lang="fr-FR" sz="1600" dirty="0" err="1" smtClean="0">
+                <a:solidFill>
+                  <a:srgbClr val="0070C0"/>
+                </a:solidFill>
+                <a:latin typeface="Consolas" pitchFamily="49" charset="0"/>
+              </a:rPr>
+              <a:t>this</a:t>
+            </a:r>
+            <a:r>
+              <a:rPr lang="fr-FR" sz="1600" dirty="0" err="1" smtClean="0">
+                <a:solidFill>
+                  <a:schemeClr val="bg1"/>
+                </a:solidFill>
+                <a:latin typeface="Consolas" pitchFamily="49" charset="0"/>
+              </a:rPr>
+              <a:t>.</a:t>
+            </a:r>
+            <a:r>
+              <a:rPr lang="fr-FR" sz="1600" dirty="0" err="1" smtClean="0">
+                <a:solidFill>
+                  <a:srgbClr val="00B0F0"/>
+                </a:solidFill>
+                <a:latin typeface="Consolas" pitchFamily="49" charset="0"/>
+              </a:rPr>
+              <a:t>authService</a:t>
+            </a:r>
+            <a:r>
+              <a:rPr lang="fr-FR" sz="1600" dirty="0" err="1" smtClean="0">
+                <a:solidFill>
+                  <a:schemeClr val="bg1"/>
+                </a:solidFill>
+                <a:latin typeface="Consolas" pitchFamily="49" charset="0"/>
+              </a:rPr>
+              <a:t>.</a:t>
+            </a:r>
+            <a:r>
+              <a:rPr lang="fr-FR" sz="1600" dirty="0" err="1" smtClean="0">
+                <a:solidFill>
+                  <a:srgbClr val="D8F141"/>
+                </a:solidFill>
+                <a:latin typeface="Consolas" pitchFamily="49" charset="0"/>
+              </a:rPr>
+              <a:t>isUserLogged</a:t>
+            </a:r>
+            <a:r>
+              <a:rPr lang="fr-FR" sz="1600" dirty="0" smtClean="0">
+                <a:solidFill>
+                  <a:schemeClr val="bg1"/>
+                </a:solidFill>
+                <a:latin typeface="Consolas" pitchFamily="49" charset="0"/>
+              </a:rPr>
+              <a:t>()) {</a:t>
+            </a:r>
+          </a:p>
+          <a:p>
+            <a:r>
+              <a:rPr lang="fr-FR" sz="1600" dirty="0" smtClean="0">
+                <a:solidFill>
+                  <a:schemeClr val="bg1"/>
+                </a:solidFill>
+                <a:latin typeface="Consolas" pitchFamily="49" charset="0"/>
+              </a:rPr>
+              <a:t>      </a:t>
+            </a:r>
+            <a:r>
+              <a:rPr lang="fr-FR" sz="1600" dirty="0" smtClean="0">
+                <a:solidFill>
+                  <a:srgbClr val="7030A0"/>
+                </a:solidFill>
+                <a:latin typeface="Consolas" pitchFamily="49" charset="0"/>
+              </a:rPr>
+              <a:t>return</a:t>
+            </a:r>
+            <a:r>
+              <a:rPr lang="fr-FR" sz="1600" dirty="0" smtClean="0">
+                <a:solidFill>
+                  <a:schemeClr val="bg1"/>
+                </a:solidFill>
+                <a:latin typeface="Consolas" pitchFamily="49" charset="0"/>
+              </a:rPr>
+              <a:t> </a:t>
+            </a:r>
+            <a:r>
+              <a:rPr lang="fr-FR" sz="1600" dirty="0" err="1" smtClean="0">
+                <a:solidFill>
+                  <a:srgbClr val="00B0F0"/>
+                </a:solidFill>
+                <a:latin typeface="Consolas" pitchFamily="49" charset="0"/>
+              </a:rPr>
+              <a:t>true</a:t>
+            </a:r>
+            <a:r>
+              <a:rPr lang="fr-FR" sz="1600" dirty="0" smtClean="0">
+                <a:solidFill>
+                  <a:schemeClr val="bg1"/>
+                </a:solidFill>
+                <a:latin typeface="Consolas" pitchFamily="49" charset="0"/>
+              </a:rPr>
+              <a:t>;</a:t>
+            </a:r>
+            <a:endParaRPr lang="fr-FR" sz="1600" dirty="0">
+              <a:solidFill>
+                <a:srgbClr val="00B0F0"/>
+              </a:solidFill>
+              <a:latin typeface="Consolas" pitchFamily="49" charset="0"/>
+            </a:endParaRPr>
+          </a:p>
+          <a:p>
+            <a:r>
+              <a:rPr lang="fr-FR" sz="1600" dirty="0">
+                <a:solidFill>
+                  <a:schemeClr val="bg1"/>
+                </a:solidFill>
+                <a:latin typeface="Consolas" pitchFamily="49" charset="0"/>
+              </a:rPr>
+              <a:t> </a:t>
+            </a:r>
+            <a:r>
+              <a:rPr lang="fr-FR" sz="1600" dirty="0" smtClean="0">
+                <a:solidFill>
+                  <a:schemeClr val="bg1"/>
+                </a:solidFill>
+                <a:latin typeface="Consolas" pitchFamily="49" charset="0"/>
+              </a:rPr>
+              <a:t>   } </a:t>
+            </a:r>
+            <a:r>
+              <a:rPr lang="fr-FR" sz="1600" dirty="0" err="1" smtClean="0">
+                <a:solidFill>
+                  <a:srgbClr val="7030A0"/>
+                </a:solidFill>
+                <a:latin typeface="Consolas" pitchFamily="49" charset="0"/>
+              </a:rPr>
+              <a:t>else</a:t>
+            </a:r>
+            <a:r>
+              <a:rPr lang="fr-FR" sz="1600" dirty="0" smtClean="0">
+                <a:solidFill>
+                  <a:schemeClr val="bg1"/>
+                </a:solidFill>
+                <a:latin typeface="Consolas" pitchFamily="49" charset="0"/>
+              </a:rPr>
+              <a:t> {</a:t>
+            </a:r>
+          </a:p>
+          <a:p>
+            <a:r>
+              <a:rPr lang="fr-FR" sz="1600" dirty="0" smtClean="0">
+                <a:solidFill>
+                  <a:schemeClr val="bg1"/>
+                </a:solidFill>
+                <a:latin typeface="Consolas" pitchFamily="49" charset="0"/>
+              </a:rPr>
+              <a:t>      </a:t>
+            </a:r>
+            <a:r>
+              <a:rPr lang="fr-FR" sz="1600" dirty="0" err="1" smtClean="0">
+                <a:solidFill>
+                  <a:srgbClr val="0070C0"/>
+                </a:solidFill>
+                <a:latin typeface="Consolas" pitchFamily="49" charset="0"/>
+              </a:rPr>
+              <a:t>this</a:t>
+            </a:r>
+            <a:r>
+              <a:rPr lang="fr-FR" sz="1600" dirty="0" err="1" smtClean="0">
+                <a:solidFill>
+                  <a:schemeClr val="bg1"/>
+                </a:solidFill>
+                <a:latin typeface="Consolas" pitchFamily="49" charset="0"/>
+              </a:rPr>
+              <a:t>.</a:t>
+            </a:r>
+            <a:r>
+              <a:rPr lang="fr-FR" sz="1600" dirty="0" err="1" smtClean="0">
+                <a:solidFill>
+                  <a:srgbClr val="00B0F0"/>
+                </a:solidFill>
+                <a:latin typeface="Consolas" pitchFamily="49" charset="0"/>
+              </a:rPr>
+              <a:t>router</a:t>
+            </a:r>
+            <a:r>
+              <a:rPr lang="fr-FR" sz="1600" dirty="0" err="1" smtClean="0">
+                <a:solidFill>
+                  <a:schemeClr val="bg1"/>
+                </a:solidFill>
+                <a:latin typeface="Consolas" pitchFamily="49" charset="0"/>
+              </a:rPr>
+              <a:t>.</a:t>
+            </a:r>
+            <a:r>
+              <a:rPr lang="fr-FR" sz="1600" dirty="0" err="1" smtClean="0">
+                <a:solidFill>
+                  <a:srgbClr val="D8F141"/>
+                </a:solidFill>
+                <a:latin typeface="Consolas" pitchFamily="49" charset="0"/>
+              </a:rPr>
+              <a:t>navigate</a:t>
+            </a:r>
+            <a:r>
+              <a:rPr lang="fr-FR" sz="1600" dirty="0">
+                <a:solidFill>
+                  <a:schemeClr val="bg1"/>
+                </a:solidFill>
+                <a:latin typeface="Consolas" pitchFamily="49" charset="0"/>
+              </a:rPr>
+              <a:t>([</a:t>
+            </a:r>
+            <a:r>
+              <a:rPr lang="fr-FR" sz="1600" dirty="0">
+                <a:solidFill>
+                  <a:schemeClr val="accent5"/>
+                </a:solidFill>
+                <a:latin typeface="Consolas" pitchFamily="49" charset="0"/>
+              </a:rPr>
+              <a:t>'/login'</a:t>
+            </a:r>
+            <a:r>
+              <a:rPr lang="fr-FR" sz="1600" dirty="0">
+                <a:solidFill>
+                  <a:schemeClr val="bg1"/>
+                </a:solidFill>
+                <a:latin typeface="Consolas" pitchFamily="49" charset="0"/>
+              </a:rPr>
+              <a:t>]);</a:t>
+            </a:r>
+          </a:p>
+          <a:p>
+            <a:r>
+              <a:rPr lang="fr-FR" sz="1600" dirty="0">
+                <a:solidFill>
+                  <a:schemeClr val="bg1"/>
+                </a:solidFill>
+                <a:latin typeface="Consolas" pitchFamily="49" charset="0"/>
+              </a:rPr>
+              <a:t>    </a:t>
+            </a:r>
+            <a:r>
+              <a:rPr lang="fr-FR" sz="1600" dirty="0" smtClean="0">
+                <a:solidFill>
+                  <a:schemeClr val="bg1"/>
+                </a:solidFill>
+                <a:latin typeface="Consolas" pitchFamily="49" charset="0"/>
+              </a:rPr>
+              <a:t>  </a:t>
+            </a:r>
+            <a:r>
+              <a:rPr lang="fr-FR" sz="1600" dirty="0" smtClean="0">
+                <a:solidFill>
+                  <a:srgbClr val="7030A0"/>
+                </a:solidFill>
+                <a:latin typeface="Consolas" pitchFamily="49" charset="0"/>
+              </a:rPr>
+              <a:t>return</a:t>
+            </a:r>
+            <a:r>
+              <a:rPr lang="fr-FR" sz="1600" dirty="0" smtClean="0">
+                <a:solidFill>
+                  <a:schemeClr val="bg1"/>
+                </a:solidFill>
+                <a:latin typeface="Consolas" pitchFamily="49" charset="0"/>
+              </a:rPr>
+              <a:t> </a:t>
+            </a:r>
+            <a:r>
+              <a:rPr lang="fr-FR" sz="1600" dirty="0">
+                <a:solidFill>
+                  <a:srgbClr val="00B0F0"/>
+                </a:solidFill>
+                <a:latin typeface="Consolas" pitchFamily="49" charset="0"/>
+              </a:rPr>
+              <a:t>false</a:t>
+            </a:r>
+            <a:r>
+              <a:rPr lang="fr-FR" sz="1600" dirty="0">
+                <a:solidFill>
+                  <a:schemeClr val="bg1"/>
+                </a:solidFill>
+                <a:latin typeface="Consolas" pitchFamily="49" charset="0"/>
+              </a:rPr>
+              <a:t>;</a:t>
+            </a:r>
+          </a:p>
+          <a:p>
+            <a:r>
+              <a:rPr lang="fr-FR" sz="1600" dirty="0" smtClean="0">
+                <a:solidFill>
+                  <a:schemeClr val="bg1"/>
+                </a:solidFill>
+                <a:latin typeface="Consolas" pitchFamily="49" charset="0"/>
+              </a:rPr>
+              <a:t>    }</a:t>
+            </a:r>
+          </a:p>
+          <a:p>
+            <a:r>
+              <a:rPr lang="fr-FR" sz="1600" dirty="0">
+                <a:solidFill>
+                  <a:schemeClr val="bg1"/>
+                </a:solidFill>
+                <a:latin typeface="Consolas" pitchFamily="49" charset="0"/>
+              </a:rPr>
+              <a:t> </a:t>
+            </a:r>
+            <a:r>
+              <a:rPr lang="fr-FR" sz="1600" dirty="0" smtClean="0">
+                <a:solidFill>
+                  <a:schemeClr val="bg1"/>
+                </a:solidFill>
+                <a:latin typeface="Consolas" pitchFamily="49" charset="0"/>
+              </a:rPr>
+              <a:t> }</a:t>
+            </a:r>
+            <a:endParaRPr lang="fr-FR" sz="1600" dirty="0">
+              <a:solidFill>
+                <a:schemeClr val="bg1"/>
+              </a:solidFill>
+              <a:latin typeface="Consolas" pitchFamily="49" charset="0"/>
+            </a:endParaRPr>
+          </a:p>
+          <a:p>
+            <a:r>
+              <a:rPr lang="fr-FR" sz="1600" dirty="0">
+                <a:solidFill>
+                  <a:schemeClr val="bg1"/>
+                </a:solidFill>
+                <a:latin typeface="Consolas" pitchFamily="49" charset="0"/>
+              </a:rPr>
+              <a:t>}</a:t>
+            </a:r>
+            <a:endParaRPr lang="fr-FR" sz="1600" dirty="0">
+              <a:solidFill>
+                <a:schemeClr val="bg1"/>
+              </a:solidFill>
+              <a:latin typeface="Consolas" pitchFamily="49" charset="0"/>
+            </a:endParaRPr>
+          </a:p>
+        </p:txBody>
+      </p:sp>
+    </p:spTree>
+    <p:extLst>
+      <p:ext uri="{BB962C8B-B14F-4D97-AF65-F5344CB8AC3E}">
+        <p14:creationId xmlns:p14="http://schemas.microsoft.com/office/powerpoint/2010/main" val="388040105"/>
+      </p:ext>
+    </p:extLst>
+  </p:cSld>
+  <p:clrMapOvr>
+    <a:masterClrMapping/>
+  </p:clrMapOvr>
+</p:sld>
+</file>
+
+<file path=ppt/slides/slide43.xml><?xml version="1.0" encoding="utf-8"?>
+<p:sld xmlns:a="http://schemas.openxmlformats.org/drawingml/2006/main" xmlns:r="http://schemas.openxmlformats.org/officeDocument/2006/relationships" xmlns:p="http://schemas.openxmlformats.org/presentationml/2006/main">
+  <p:cSld>
+    <p:spTree>
+      <p:nvGrpSpPr>
+        <p:cNvPr id="1" name=""/>
+        <p:cNvGrpSpPr/>
+        <p:nvPr/>
+      </p:nvGrpSpPr>
+      <p:grpSpPr>
+        <a:xfrm>
+          <a:off x="0" y="0"/>
+          <a:ext cx="0" cy="0"/>
+          <a:chOff x="0" y="0"/>
+          <a:chExt cx="0" cy="0"/>
+        </a:xfrm>
+      </p:grpSpPr>
+      <p:sp>
+        <p:nvSpPr>
+          <p:cNvPr id="5" name="Slide Number Placeholder 4"/>
+          <p:cNvSpPr>
+            <a:spLocks noGrp="1"/>
+          </p:cNvSpPr>
+          <p:nvPr>
+            <p:ph type="sldNum" sz="quarter" idx="12"/>
+            <p:custDataLst>
+              <p:tags r:id="rId1"/>
+            </p:custDataLst>
+          </p:nvPr>
+        </p:nvSpPr>
+        <p:spPr/>
+        <p:txBody>
+          <a:bodyPr/>
+          <a:lstStyle/>
+          <a:p>
+            <a:fld id="{525A3C56-E491-49B2-93F3-63532DF516BC}" type="slidenum">
+              <a:rPr lang="en-GB" smtClean="0"/>
+              <a:pPr/>
+              <a:t>43</a:t>
+            </a:fld>
+            <a:endParaRPr lang="en-GB" dirty="0"/>
+          </a:p>
+        </p:txBody>
+      </p:sp>
+      <p:sp>
+        <p:nvSpPr>
+          <p:cNvPr id="8" name="Title 7"/>
+          <p:cNvSpPr>
+            <a:spLocks noGrp="1"/>
+          </p:cNvSpPr>
+          <p:nvPr>
+            <p:ph type="title"/>
+            <p:custDataLst>
+              <p:tags r:id="rId2"/>
+            </p:custDataLst>
+          </p:nvPr>
+        </p:nvSpPr>
+        <p:spPr/>
+        <p:txBody>
+          <a:bodyPr/>
+          <a:lstStyle/>
+          <a:p>
+            <a:r>
+              <a:rPr lang="fr-FR" dirty="0" err="1" smtClean="0"/>
+              <a:t>Routing</a:t>
+            </a:r>
+            <a:endParaRPr lang="fr-CA" dirty="0"/>
+          </a:p>
+        </p:txBody>
+      </p:sp>
+      <p:sp>
+        <p:nvSpPr>
+          <p:cNvPr id="10" name="ZoneTexte 9"/>
+          <p:cNvSpPr txBox="1"/>
+          <p:nvPr/>
+        </p:nvSpPr>
+        <p:spPr bwMode="auto">
+          <a:xfrm>
+            <a:off x="452284" y="1312606"/>
+            <a:ext cx="3972232" cy="276999"/>
+          </a:xfrm>
+          <a:prstGeom prst="rect">
+            <a:avLst/>
+          </a:prstGeom>
+          <a:noFill/>
+          <a:ln w="9525" algn="ctr">
+            <a:noFill/>
+            <a:miter lim="800000"/>
+            <a:headEnd/>
+            <a:tailEnd/>
+          </a:ln>
+          <a:effectLst/>
+        </p:spPr>
+        <p:txBody>
+          <a:bodyPr wrap="square" lIns="0" tIns="0" rIns="0" bIns="0" rtlCol="0">
+            <a:spAutoFit/>
+          </a:bodyPr>
+          <a:lstStyle/>
+          <a:p>
+            <a:r>
+              <a:rPr lang="fr-FR" dirty="0" err="1" smtClean="0">
+                <a:cs typeface="Arial" pitchFamily="34" charset="0"/>
+              </a:rPr>
+              <a:t>app.module.ts</a:t>
+            </a:r>
+            <a:endParaRPr lang="fr-FR" dirty="0" smtClean="0">
+              <a:cs typeface="Arial" pitchFamily="34" charset="0"/>
+            </a:endParaRPr>
+          </a:p>
+        </p:txBody>
+      </p:sp>
+      <p:sp>
+        <p:nvSpPr>
+          <p:cNvPr id="3" name="Rectangle 2"/>
+          <p:cNvSpPr/>
+          <p:nvPr/>
+        </p:nvSpPr>
+        <p:spPr>
+          <a:xfrm>
+            <a:off x="447675" y="1700029"/>
+            <a:ext cx="7930781" cy="1815882"/>
+          </a:xfrm>
+          <a:prstGeom prst="rect">
+            <a:avLst/>
+          </a:prstGeom>
+          <a:solidFill>
+            <a:schemeClr val="tx1">
+              <a:lumMod val="75000"/>
+            </a:schemeClr>
+          </a:solidFill>
+        </p:spPr>
+        <p:txBody>
+          <a:bodyPr wrap="square">
+            <a:spAutoFit/>
+          </a:bodyPr>
+          <a:lstStyle/>
+          <a:p>
+            <a:pPr lvl="0">
+              <a:spcBef>
+                <a:spcPts val="0"/>
+              </a:spcBef>
+            </a:pPr>
+            <a:r>
+              <a:rPr lang="fr-FR" sz="1600" dirty="0" err="1">
+                <a:solidFill>
+                  <a:srgbClr val="0070C0"/>
+                </a:solidFill>
+                <a:latin typeface="Consolas" pitchFamily="49" charset="0"/>
+                <a:ea typeface="Calibri"/>
+                <a:cs typeface="Calibri"/>
+                <a:sym typeface="Calibri"/>
+              </a:rPr>
+              <a:t>const</a:t>
+            </a:r>
+            <a:r>
+              <a:rPr lang="fr-FR" sz="1600" dirty="0">
+                <a:solidFill>
+                  <a:srgbClr val="0070C0"/>
+                </a:solidFill>
+                <a:latin typeface="Consolas" pitchFamily="49" charset="0"/>
+                <a:ea typeface="Calibri"/>
+                <a:cs typeface="Calibri"/>
+                <a:sym typeface="Calibri"/>
+              </a:rPr>
+              <a:t> </a:t>
+            </a:r>
+            <a:r>
+              <a:rPr lang="fr-FR" sz="1600" dirty="0">
+                <a:solidFill>
+                  <a:srgbClr val="00B0F0"/>
+                </a:solidFill>
+                <a:latin typeface="Consolas" pitchFamily="49" charset="0"/>
+                <a:ea typeface="Calibri"/>
+                <a:cs typeface="Calibri"/>
+                <a:sym typeface="Calibri"/>
+              </a:rPr>
+              <a:t>routes</a:t>
+            </a:r>
+            <a:r>
+              <a:rPr lang="fr-FR" sz="1600" dirty="0">
+                <a:solidFill>
+                  <a:schemeClr val="bg1"/>
+                </a:solidFill>
+                <a:latin typeface="Consolas" pitchFamily="49" charset="0"/>
+                <a:ea typeface="Calibri"/>
+                <a:cs typeface="Calibri"/>
+                <a:sym typeface="Calibri"/>
+              </a:rPr>
+              <a:t>: </a:t>
+            </a:r>
+            <a:r>
+              <a:rPr lang="fr-FR" sz="1600" dirty="0">
+                <a:solidFill>
+                  <a:srgbClr val="92D050"/>
+                </a:solidFill>
+                <a:latin typeface="Consolas" pitchFamily="49" charset="0"/>
+                <a:ea typeface="Calibri"/>
+                <a:cs typeface="Calibri"/>
+                <a:sym typeface="Calibri"/>
+              </a:rPr>
+              <a:t>Routes</a:t>
+            </a:r>
+            <a:r>
+              <a:rPr lang="fr-FR" sz="1600" dirty="0">
+                <a:solidFill>
+                  <a:schemeClr val="bg1"/>
+                </a:solidFill>
+                <a:latin typeface="Consolas" pitchFamily="49" charset="0"/>
+                <a:ea typeface="Calibri"/>
+                <a:cs typeface="Calibri"/>
+                <a:sym typeface="Calibri"/>
+              </a:rPr>
+              <a:t> = [</a:t>
+            </a:r>
+          </a:p>
+          <a:p>
+            <a:pPr lvl="0">
+              <a:spcBef>
+                <a:spcPts val="0"/>
+              </a:spcBef>
+            </a:pPr>
+            <a:r>
+              <a:rPr lang="fr-FR" sz="1600" dirty="0">
+                <a:solidFill>
+                  <a:schemeClr val="bg1"/>
+                </a:solidFill>
+                <a:latin typeface="Consolas" pitchFamily="49" charset="0"/>
+                <a:ea typeface="Calibri"/>
+                <a:cs typeface="Calibri"/>
+                <a:sym typeface="Calibri"/>
+              </a:rPr>
+              <a:t>  { </a:t>
+            </a:r>
+          </a:p>
+          <a:p>
+            <a:pPr lvl="0">
+              <a:spcBef>
+                <a:spcPts val="0"/>
+              </a:spcBef>
+            </a:pPr>
+            <a:r>
+              <a:rPr lang="fr-FR" sz="1600" dirty="0">
+                <a:solidFill>
+                  <a:schemeClr val="bg1"/>
+                </a:solidFill>
+                <a:latin typeface="Consolas" pitchFamily="49" charset="0"/>
+                <a:ea typeface="Calibri"/>
+                <a:cs typeface="Calibri"/>
+                <a:sym typeface="Calibri"/>
+              </a:rPr>
+              <a:t>    </a:t>
+            </a:r>
+            <a:r>
+              <a:rPr lang="fr-FR" sz="1600" dirty="0" err="1">
+                <a:solidFill>
+                  <a:srgbClr val="00B0F0"/>
+                </a:solidFill>
+                <a:latin typeface="Consolas" pitchFamily="49" charset="0"/>
+                <a:ea typeface="Calibri"/>
+                <a:cs typeface="Calibri"/>
+                <a:sym typeface="Calibri"/>
+              </a:rPr>
+              <a:t>path</a:t>
+            </a:r>
+            <a:r>
+              <a:rPr lang="fr-FR" sz="1600" dirty="0">
+                <a:solidFill>
+                  <a:schemeClr val="bg1"/>
+                </a:solidFill>
+                <a:latin typeface="Consolas" pitchFamily="49" charset="0"/>
+                <a:ea typeface="Calibri"/>
+                <a:cs typeface="Calibri"/>
+                <a:sym typeface="Calibri"/>
+              </a:rPr>
+              <a:t>: </a:t>
+            </a:r>
+            <a:r>
+              <a:rPr lang="fr-FR" sz="1600" dirty="0">
+                <a:solidFill>
+                  <a:schemeClr val="accent5"/>
+                </a:solidFill>
+                <a:latin typeface="Consolas" pitchFamily="49" charset="0"/>
+                <a:ea typeface="Calibri"/>
+                <a:cs typeface="Calibri"/>
+                <a:sym typeface="Calibri"/>
+              </a:rPr>
+              <a:t>'</a:t>
+            </a:r>
+            <a:r>
+              <a:rPr lang="fr-FR" sz="1600" dirty="0" err="1">
+                <a:solidFill>
+                  <a:schemeClr val="accent5"/>
+                </a:solidFill>
+                <a:latin typeface="Consolas" pitchFamily="49" charset="0"/>
+                <a:ea typeface="Calibri"/>
+                <a:cs typeface="Calibri"/>
+                <a:sym typeface="Calibri"/>
+              </a:rPr>
+              <a:t>secured</a:t>
+            </a:r>
+            <a:r>
+              <a:rPr lang="fr-FR" sz="1600" dirty="0">
+                <a:solidFill>
+                  <a:schemeClr val="accent5"/>
+                </a:solidFill>
+                <a:latin typeface="Consolas" pitchFamily="49" charset="0"/>
+                <a:ea typeface="Calibri"/>
+                <a:cs typeface="Calibri"/>
+                <a:sym typeface="Calibri"/>
+              </a:rPr>
+              <a:t>'</a:t>
+            </a:r>
+            <a:r>
+              <a:rPr lang="fr-FR" sz="1600" dirty="0">
+                <a:solidFill>
+                  <a:schemeClr val="bg1"/>
+                </a:solidFill>
+                <a:latin typeface="Consolas" pitchFamily="49" charset="0"/>
+                <a:ea typeface="Calibri"/>
+                <a:cs typeface="Calibri"/>
+                <a:sym typeface="Calibri"/>
+              </a:rPr>
+              <a:t>, </a:t>
+            </a:r>
+          </a:p>
+          <a:p>
+            <a:pPr lvl="0">
+              <a:spcBef>
+                <a:spcPts val="0"/>
+              </a:spcBef>
+            </a:pPr>
+            <a:r>
+              <a:rPr lang="fr-FR" sz="1600" dirty="0">
+                <a:solidFill>
+                  <a:schemeClr val="bg1"/>
+                </a:solidFill>
+                <a:latin typeface="Consolas" pitchFamily="49" charset="0"/>
+                <a:ea typeface="Calibri"/>
+                <a:cs typeface="Calibri"/>
+                <a:sym typeface="Calibri"/>
+              </a:rPr>
+              <a:t>    </a:t>
+            </a:r>
+            <a:r>
+              <a:rPr lang="fr-FR" sz="1600" dirty="0">
+                <a:solidFill>
+                  <a:srgbClr val="00B0F0"/>
+                </a:solidFill>
+                <a:latin typeface="Consolas" pitchFamily="49" charset="0"/>
+                <a:ea typeface="Calibri"/>
+                <a:cs typeface="Calibri"/>
+                <a:sym typeface="Calibri"/>
+              </a:rPr>
+              <a:t>component</a:t>
+            </a:r>
+            <a:r>
+              <a:rPr lang="fr-FR" sz="1600" dirty="0">
+                <a:solidFill>
+                  <a:schemeClr val="bg1"/>
+                </a:solidFill>
+                <a:latin typeface="Consolas" pitchFamily="49" charset="0"/>
+                <a:ea typeface="Calibri"/>
+                <a:cs typeface="Calibri"/>
+                <a:sym typeface="Calibri"/>
+              </a:rPr>
+              <a:t>: </a:t>
+            </a:r>
+            <a:r>
+              <a:rPr lang="fr-FR" sz="1600" dirty="0" err="1">
+                <a:solidFill>
+                  <a:srgbClr val="00B0F0"/>
+                </a:solidFill>
+                <a:latin typeface="Consolas" pitchFamily="49" charset="0"/>
+                <a:ea typeface="Calibri"/>
+                <a:cs typeface="Calibri"/>
+                <a:sym typeface="Calibri"/>
+              </a:rPr>
+              <a:t>SecuredComponent</a:t>
+            </a:r>
+            <a:r>
+              <a:rPr lang="fr-FR" sz="1600" dirty="0">
+                <a:solidFill>
+                  <a:schemeClr val="bg1"/>
+                </a:solidFill>
+                <a:latin typeface="Consolas" pitchFamily="49" charset="0"/>
+                <a:ea typeface="Calibri"/>
+                <a:cs typeface="Calibri"/>
+                <a:sym typeface="Calibri"/>
+              </a:rPr>
+              <a:t>,</a:t>
+            </a:r>
+          </a:p>
+          <a:p>
+            <a:pPr lvl="0">
+              <a:spcBef>
+                <a:spcPts val="0"/>
+              </a:spcBef>
+            </a:pPr>
+            <a:r>
+              <a:rPr lang="fr-FR" sz="1600" dirty="0">
+                <a:solidFill>
+                  <a:schemeClr val="bg1"/>
+                </a:solidFill>
+                <a:latin typeface="Consolas" pitchFamily="49" charset="0"/>
+                <a:ea typeface="Calibri"/>
+                <a:cs typeface="Calibri"/>
+                <a:sym typeface="Calibri"/>
+              </a:rPr>
+              <a:t>    </a:t>
+            </a:r>
+            <a:r>
+              <a:rPr lang="fr-FR" sz="1600" dirty="0" err="1">
+                <a:solidFill>
+                  <a:srgbClr val="00B0F0"/>
+                </a:solidFill>
+                <a:latin typeface="Consolas" pitchFamily="49" charset="0"/>
+                <a:ea typeface="Calibri"/>
+                <a:cs typeface="Calibri"/>
+                <a:sym typeface="Calibri"/>
+              </a:rPr>
+              <a:t>canActivate</a:t>
+            </a:r>
+            <a:r>
+              <a:rPr lang="fr-FR" sz="1600" dirty="0">
+                <a:solidFill>
+                  <a:schemeClr val="bg1"/>
+                </a:solidFill>
+                <a:latin typeface="Consolas" pitchFamily="49" charset="0"/>
+                <a:ea typeface="Calibri"/>
+                <a:cs typeface="Calibri"/>
+                <a:sym typeface="Calibri"/>
+              </a:rPr>
+              <a:t>: [</a:t>
+            </a:r>
+            <a:r>
+              <a:rPr lang="fr-FR" sz="1600" dirty="0" err="1">
+                <a:solidFill>
+                  <a:srgbClr val="00B0F0"/>
+                </a:solidFill>
+                <a:latin typeface="Consolas" pitchFamily="49" charset="0"/>
+                <a:ea typeface="Calibri"/>
+                <a:cs typeface="Calibri"/>
+                <a:sym typeface="Calibri"/>
+              </a:rPr>
+              <a:t>AuthGuard</a:t>
+            </a:r>
+            <a:r>
+              <a:rPr lang="fr-FR" sz="1600" dirty="0">
+                <a:solidFill>
+                  <a:schemeClr val="bg1"/>
+                </a:solidFill>
+                <a:latin typeface="Consolas" pitchFamily="49" charset="0"/>
+                <a:ea typeface="Calibri"/>
+                <a:cs typeface="Calibri"/>
+                <a:sym typeface="Calibri"/>
+              </a:rPr>
+              <a:t>]</a:t>
+            </a:r>
+          </a:p>
+          <a:p>
+            <a:pPr lvl="0">
+              <a:spcBef>
+                <a:spcPts val="0"/>
+              </a:spcBef>
+            </a:pPr>
+            <a:r>
+              <a:rPr lang="fr-FR" sz="1600" dirty="0">
+                <a:solidFill>
+                  <a:schemeClr val="bg1"/>
+                </a:solidFill>
+                <a:latin typeface="Consolas" pitchFamily="49" charset="0"/>
+                <a:ea typeface="Calibri"/>
+                <a:cs typeface="Calibri"/>
+                <a:sym typeface="Calibri"/>
+              </a:rPr>
+              <a:t>  }</a:t>
+            </a:r>
+          </a:p>
+          <a:p>
+            <a:pPr lvl="0">
+              <a:spcBef>
+                <a:spcPts val="0"/>
+              </a:spcBef>
+            </a:pPr>
+            <a:r>
+              <a:rPr lang="fr-FR" sz="1600" dirty="0">
+                <a:solidFill>
+                  <a:schemeClr val="bg1"/>
+                </a:solidFill>
+                <a:latin typeface="Consolas" pitchFamily="49" charset="0"/>
+                <a:ea typeface="Calibri"/>
+                <a:cs typeface="Calibri"/>
+                <a:sym typeface="Calibri"/>
+              </a:rPr>
+              <a:t>];</a:t>
+            </a:r>
+          </a:p>
+        </p:txBody>
+      </p:sp>
+    </p:spTree>
+    <p:extLst>
+      <p:ext uri="{BB962C8B-B14F-4D97-AF65-F5344CB8AC3E}">
+        <p14:creationId xmlns:p14="http://schemas.microsoft.com/office/powerpoint/2010/main" val="782884093"/>
+      </p:ext>
+    </p:extLst>
+  </p:cSld>
+  <p:clrMapOvr>
+    <a:masterClrMapping/>
+  </p:clrMapOvr>
+  <p:timing>
+    <p:tnLst>
+      <p:par>
+        <p:cTn id="1" dur="indefinite" restart="never" nodeType="tmRoot"/>
+      </p:par>
+    </p:tnLst>
+  </p:timing>
+</p:sld>
+</file>
+
+<file path=ppt/slides/slide44.xml><?xml version="1.0" encoding="utf-8"?>
+<p:sld xmlns:a="http://schemas.openxmlformats.org/drawingml/2006/main" xmlns:r="http://schemas.openxmlformats.org/officeDocument/2006/relationships" xmlns:p="http://schemas.openxmlformats.org/presentationml/2006/main">
+  <p:cSld>
+    <p:spTree>
+      <p:nvGrpSpPr>
+        <p:cNvPr id="1" name=""/>
+        <p:cNvGrpSpPr/>
+        <p:nvPr/>
+      </p:nvGrpSpPr>
+      <p:grpSpPr>
+        <a:xfrm>
+          <a:off x="0" y="0"/>
+          <a:ext cx="0" cy="0"/>
+          <a:chOff x="0" y="0"/>
+          <a:chExt cx="0" cy="0"/>
+        </a:xfrm>
+      </p:grpSpPr>
+      <p:sp>
+        <p:nvSpPr>
+          <p:cNvPr id="8" name="Title 7"/>
+          <p:cNvSpPr>
+            <a:spLocks noGrp="1"/>
+          </p:cNvSpPr>
+          <p:nvPr>
+            <p:ph type="title"/>
+            <p:custDataLst>
+              <p:tags r:id="rId1"/>
+            </p:custDataLst>
+          </p:nvPr>
+        </p:nvSpPr>
+        <p:spPr/>
+        <p:txBody>
+          <a:bodyPr/>
+          <a:lstStyle/>
+          <a:p>
+            <a:r>
+              <a:rPr lang="fr-CA" dirty="0" smtClean="0"/>
+              <a:t>TP #3</a:t>
+            </a:r>
+            <a:endParaRPr lang="fr-CA" dirty="0"/>
+          </a:p>
+        </p:txBody>
+      </p:sp>
+      <p:sp>
+        <p:nvSpPr>
+          <p:cNvPr id="6" name="Espace réservé du contenu 5"/>
+          <p:cNvSpPr>
+            <a:spLocks noGrp="1"/>
+          </p:cNvSpPr>
+          <p:nvPr>
+            <p:ph sz="quarter" idx="17"/>
+          </p:nvPr>
+        </p:nvSpPr>
+        <p:spPr/>
+        <p:txBody>
+          <a:bodyPr/>
+          <a:lstStyle/>
+          <a:p>
+            <a:pPr marL="342900" indent="-342900">
+              <a:buFont typeface="Arial" pitchFamily="34" charset="0"/>
+              <a:buChar char="•"/>
+            </a:pPr>
+            <a:r>
+              <a:rPr lang="fr-FR" dirty="0" smtClean="0"/>
+              <a:t>Récupérer la branche tp3 sur Git </a:t>
+            </a:r>
+          </a:p>
+          <a:p>
+            <a:pPr marL="342900" indent="-342900">
+              <a:buFont typeface="Arial" pitchFamily="34" charset="0"/>
+              <a:buChar char="•"/>
+            </a:pPr>
+            <a:endParaRPr lang="fr-FR" dirty="0"/>
+          </a:p>
+          <a:p>
+            <a:pPr marL="342900" indent="-342900">
+              <a:buFont typeface="Arial" pitchFamily="34" charset="0"/>
+              <a:buChar char="•"/>
+            </a:pPr>
+            <a:r>
+              <a:rPr lang="fr-FR" dirty="0" smtClean="0"/>
+              <a:t>Consignes:</a:t>
+            </a:r>
+          </a:p>
+          <a:p>
+            <a:pPr marL="606425" lvl="1" indent="-342900"/>
+            <a:r>
+              <a:rPr lang="fr-FR" dirty="0" smtClean="0"/>
+              <a:t>Créer un service permettant de récupérer la liste de tous les joueurs</a:t>
+            </a:r>
+            <a:r>
+              <a:rPr lang="fr-FR" dirty="0"/>
+              <a:t>, un joueur depuis son </a:t>
+            </a:r>
+            <a:r>
+              <a:rPr lang="fr-FR" dirty="0" smtClean="0"/>
+              <a:t>id, la liste de toutes les équipes et une équipe depuis son id</a:t>
+            </a:r>
+          </a:p>
+          <a:p>
+            <a:pPr marL="606425" lvl="1" indent="-342900"/>
+            <a:r>
+              <a:rPr lang="fr-FR" dirty="0" smtClean="0"/>
+              <a:t>Injecter ce service dans le composant </a:t>
+            </a:r>
+            <a:r>
+              <a:rPr lang="fr-FR" i="1" dirty="0" smtClean="0"/>
+              <a:t>tp3</a:t>
+            </a:r>
+            <a:r>
+              <a:rPr lang="fr-FR" dirty="0" smtClean="0"/>
+              <a:t> et dans le composant </a:t>
+            </a:r>
+            <a:r>
+              <a:rPr lang="fr-FR" i="1" dirty="0" err="1" smtClean="0"/>
+              <a:t>player</a:t>
+            </a:r>
+            <a:endParaRPr lang="fr-FR" i="1" dirty="0" smtClean="0"/>
+          </a:p>
+          <a:p>
+            <a:pPr marL="606425" lvl="1" indent="-342900"/>
+            <a:r>
+              <a:rPr lang="fr-FR" dirty="0" smtClean="0"/>
+              <a:t>Injecter ce service dans le Pipe </a:t>
+            </a:r>
+            <a:r>
+              <a:rPr lang="fr-FR" i="1" dirty="0" err="1" smtClean="0"/>
+              <a:t>get</a:t>
+            </a:r>
+            <a:r>
+              <a:rPr lang="fr-FR" i="1" dirty="0" smtClean="0"/>
+              <a:t>-team</a:t>
+            </a:r>
+          </a:p>
+          <a:p>
+            <a:pPr marL="606425" lvl="1" indent="-342900"/>
+            <a:r>
+              <a:rPr lang="fr-FR" dirty="0" smtClean="0"/>
+              <a:t>Créer les routes permettant d’accéder aux composants </a:t>
+            </a:r>
+            <a:r>
+              <a:rPr lang="fr-FR" i="1" dirty="0" smtClean="0"/>
+              <a:t>tp3</a:t>
+            </a:r>
+            <a:r>
+              <a:rPr lang="fr-FR" dirty="0" smtClean="0"/>
+              <a:t> et </a:t>
+            </a:r>
+            <a:r>
+              <a:rPr lang="fr-FR" i="1" dirty="0" err="1" smtClean="0"/>
+              <a:t>player</a:t>
+            </a:r>
+            <a:r>
+              <a:rPr lang="fr-FR" i="1" dirty="0" smtClean="0"/>
+              <a:t> </a:t>
+            </a:r>
+            <a:r>
+              <a:rPr lang="fr-FR" dirty="0" smtClean="0"/>
+              <a:t>(avec en paramètre l’id du joueur)</a:t>
+            </a:r>
+          </a:p>
+          <a:p>
+            <a:pPr marL="606425" lvl="1" indent="-342900"/>
+            <a:r>
+              <a:rPr lang="fr-FR" dirty="0" smtClean="0"/>
+              <a:t>Ajouter les routes au module de </a:t>
+            </a:r>
+            <a:r>
+              <a:rPr lang="fr-FR" dirty="0" err="1" smtClean="0"/>
+              <a:t>routing</a:t>
+            </a:r>
+            <a:endParaRPr lang="fr-FR" dirty="0" smtClean="0"/>
+          </a:p>
+          <a:p>
+            <a:pPr marL="606425" lvl="1" indent="-342900"/>
+            <a:r>
+              <a:rPr lang="fr-FR" dirty="0" smtClean="0"/>
+              <a:t>Modifier le tableau pour rediriger le clic sur le lien vers le composant </a:t>
+            </a:r>
+            <a:r>
+              <a:rPr lang="fr-FR" i="1" dirty="0" err="1" smtClean="0"/>
+              <a:t>player</a:t>
+            </a:r>
+            <a:r>
+              <a:rPr lang="fr-FR" dirty="0" smtClean="0"/>
+              <a:t> avec l’identifiant du joueur</a:t>
+            </a:r>
+            <a:r>
+              <a:rPr lang="fr-FR" i="1" dirty="0" smtClean="0"/>
+              <a:t> </a:t>
+            </a:r>
+          </a:p>
+          <a:p>
+            <a:pPr marL="606425" lvl="1" indent="-342900"/>
+            <a:endParaRPr lang="fr-FR" dirty="0"/>
+          </a:p>
+        </p:txBody>
+      </p:sp>
+      <p:sp>
+        <p:nvSpPr>
+          <p:cNvPr id="5" name="Slide Number Placeholder 4"/>
+          <p:cNvSpPr>
+            <a:spLocks noGrp="1"/>
+          </p:cNvSpPr>
+          <p:nvPr>
+            <p:ph type="sldNum" sz="quarter" idx="12"/>
+            <p:custDataLst>
+              <p:tags r:id="rId2"/>
+            </p:custDataLst>
+          </p:nvPr>
+        </p:nvSpPr>
+        <p:spPr/>
+        <p:txBody>
+          <a:bodyPr/>
+          <a:lstStyle/>
+          <a:p>
+            <a:fld id="{525A3C56-E491-49B2-93F3-63532DF516BC}" type="slidenum">
+              <a:rPr lang="en-GB" smtClean="0"/>
+              <a:pPr/>
+              <a:t>44</a:t>
             </a:fld>
             <a:endParaRPr lang="en-GB" dirty="0"/>
           </a:p>
@@ -38656,7 +40452,7 @@
 </p:sld>
 </file>
 
-<file path=ppt/slides/slide42.xml><?xml version="1.0" encoding="utf-8"?>
+<file path=ppt/slides/slide45.xml><?xml version="1.0" encoding="utf-8"?>
 <p:sld xmlns:a="http://schemas.openxmlformats.org/drawingml/2006/main" xmlns:r="http://schemas.openxmlformats.org/officeDocument/2006/relationships" xmlns:p="http://schemas.openxmlformats.org/presentationml/2006/main">
   <p:cSld>
     <p:spTree>
@@ -41411,6 +43207,18 @@
 
 <file path=ppt/tags/tag87.xml><?xml version="1.0" encoding="utf-8"?>
 <p:tagLst xmlns:a="http://schemas.openxmlformats.org/drawingml/2006/main" xmlns:r="http://schemas.openxmlformats.org/officeDocument/2006/relationships" xmlns:p="http://schemas.openxmlformats.org/presentationml/2006/main">
+  <p:tag name="NUM" val="3"/>
+</p:tagLst>
+</file>
+
+<file path=ppt/tags/tag88.xml><?xml version="1.0" encoding="utf-8"?>
+<p:tagLst xmlns:a="http://schemas.openxmlformats.org/drawingml/2006/main" xmlns:r="http://schemas.openxmlformats.org/officeDocument/2006/relationships" xmlns:p="http://schemas.openxmlformats.org/presentationml/2006/main">
+  <p:tag name="NUM" val="1"/>
+</p:tagLst>
+</file>
+
+<file path=ppt/tags/tag89.xml><?xml version="1.0" encoding="utf-8"?>
+<p:tagLst xmlns:a="http://schemas.openxmlformats.org/drawingml/2006/main" xmlns:r="http://schemas.openxmlformats.org/officeDocument/2006/relationships" xmlns:p="http://schemas.openxmlformats.org/presentationml/2006/main">
   <p:tag name="NUM" val="1"/>
 </p:tagLst>
 </file>
@@ -41418,6 +43226,18 @@
 <file path=ppt/tags/tag9.xml><?xml version="1.0" encoding="utf-8"?>
 <p:tagLst xmlns:a="http://schemas.openxmlformats.org/drawingml/2006/main" xmlns:r="http://schemas.openxmlformats.org/officeDocument/2006/relationships" xmlns:p="http://schemas.openxmlformats.org/presentationml/2006/main">
   <p:tag name="NUM" val="4"/>
+</p:tagLst>
+</file>
+
+<file path=ppt/tags/tag90.xml><?xml version="1.0" encoding="utf-8"?>
+<p:tagLst xmlns:a="http://schemas.openxmlformats.org/drawingml/2006/main" xmlns:r="http://schemas.openxmlformats.org/officeDocument/2006/relationships" xmlns:p="http://schemas.openxmlformats.org/presentationml/2006/main">
+  <p:tag name="NUM" val="3"/>
+</p:tagLst>
+</file>
+
+<file path=ppt/tags/tag91.xml><?xml version="1.0" encoding="utf-8"?>
+<p:tagLst xmlns:a="http://schemas.openxmlformats.org/drawingml/2006/main" xmlns:r="http://schemas.openxmlformats.org/officeDocument/2006/relationships" xmlns:p="http://schemas.openxmlformats.org/presentationml/2006/main">
+  <p:tag name="NUM" val="1"/>
 </p:tagLst>
 </file>
 
@@ -42340,39 +44160,6 @@
 </file>
 
 <file path=customXml/item1.xml><?xml version="1.0" encoding="utf-8"?>
-<?mso-contentType ?>
-<FormTemplates xmlns="http://schemas.microsoft.com/sharepoint/v3/contenttype/forms">
-  <Display>DocumentLibraryForm</Display>
-  <Edit>DocumentLibraryForm</Edit>
-  <New>DocumentLibraryForm</New>
-</FormTemplates>
-</file>
-
-<file path=customXml/item2.xml><?xml version="1.0" encoding="utf-8"?>
-<p:properties xmlns:p="http://schemas.microsoft.com/office/2006/metadata/properties" xmlns:xsi="http://www.w3.org/2001/XMLSchema-instance">
-  <documentManagement>
-    <CSMeta2010Field xmlns="http://schemas.microsoft.com/sharepoint/v3">e3756241-2df6-41de-be5e-75b6e6bb08f6;2012-09-21 22:00:55;PENDINGCLASSIFICATION;False</CSMeta2010Field>
-    <c5aebc35b3e840e5912c276ffe755dcf xmlns="d95a5b16-1b8d-4c7c-9ebf-89c0983b6970">
-      <Terms xmlns="http://schemas.microsoft.com/office/infopath/2007/PartnerControls"/>
-    </c5aebc35b3e840e5912c276ffe755dcf>
-    <c79d12643ffc4d60ab657aaa1718cc32 xmlns="d95a5b16-1b8d-4c7c-9ebf-89c0983b6970">
-      <Terms xmlns="http://schemas.microsoft.com/office/infopath/2007/PartnerControls"/>
-    </c79d12643ffc4d60ab657aaa1718cc32>
-    <p43f7bb208e443c9b50eb304fe6606a3 xmlns="d95a5b16-1b8d-4c7c-9ebf-89c0983b6970">
-      <Terms xmlns="http://schemas.microsoft.com/office/infopath/2007/PartnerControls"/>
-    </p43f7bb208e443c9b50eb304fe6606a3>
-    <TaxCatchAll xmlns="d95a5b16-1b8d-4c7c-9ebf-89c0983b6970"/>
-    <h4c66fbf292e4125b0e390af25f11c04 xmlns="d95a5b16-1b8d-4c7c-9ebf-89c0983b6970">
-      <Terms xmlns="http://schemas.microsoft.com/office/infopath/2007/PartnerControls"/>
-    </h4c66fbf292e4125b0e390af25f11c04>
-    <eafb632c3f5c40ba98242be6bbd6bb17 xmlns="d95a5b16-1b8d-4c7c-9ebf-89c0983b6970">
-      <Terms xmlns="http://schemas.microsoft.com/office/infopath/2007/PartnerControls"/>
-    </eafb632c3f5c40ba98242be6bbd6bb17>
-  </documentManagement>
-</p:properties>
-</file>
-
-<file path=customXml/item3.xml><?xml version="1.0" encoding="utf-8"?>
 <ct:contentTypeSchema xmlns:ct="http://schemas.microsoft.com/office/2006/metadata/contentType" xmlns:ma="http://schemas.microsoft.com/office/2006/metadata/properties/metaAttributes" ct:_="" ma:_="" ma:contentTypeName="Document" ma:contentTypeID="0x01010005E88B5A4C166F4D845B9CCD5CB96BA1" ma:contentTypeVersion="12" ma:contentTypeDescription="Create a new document." ma:contentTypeScope="" ma:versionID="932543ea927b72e086287f4d6b3ada9b">
   <xsd:schema xmlns:xsd="http://www.w3.org/2001/XMLSchema" xmlns:xs="http://www.w3.org/2001/XMLSchema" xmlns:p="http://schemas.microsoft.com/office/2006/metadata/properties" xmlns:ns1="http://schemas.microsoft.com/sharepoint/v3" xmlns:ns2="d95a5b16-1b8d-4c7c-9ebf-89c0983b6970" targetNamespace="http://schemas.microsoft.com/office/2006/metadata/properties" ma:root="true" ma:fieldsID="c4e0bb6a8f3c457cd45f9ca23030de3a" ns1:_="" ns2:_="">
     <xsd:import namespace="http://schemas.microsoft.com/sharepoint/v3"/>
@@ -42567,6 +44354,39 @@
 </ct:contentTypeSchema>
 </file>
 
+<file path=customXml/item2.xml><?xml version="1.0" encoding="utf-8"?>
+<p:properties xmlns:p="http://schemas.microsoft.com/office/2006/metadata/properties" xmlns:xsi="http://www.w3.org/2001/XMLSchema-instance">
+  <documentManagement>
+    <CSMeta2010Field xmlns="http://schemas.microsoft.com/sharepoint/v3">e3756241-2df6-41de-be5e-75b6e6bb08f6;2012-09-21 22:00:55;PENDINGCLASSIFICATION;False</CSMeta2010Field>
+    <c5aebc35b3e840e5912c276ffe755dcf xmlns="d95a5b16-1b8d-4c7c-9ebf-89c0983b6970">
+      <Terms xmlns="http://schemas.microsoft.com/office/infopath/2007/PartnerControls"/>
+    </c5aebc35b3e840e5912c276ffe755dcf>
+    <c79d12643ffc4d60ab657aaa1718cc32 xmlns="d95a5b16-1b8d-4c7c-9ebf-89c0983b6970">
+      <Terms xmlns="http://schemas.microsoft.com/office/infopath/2007/PartnerControls"/>
+    </c79d12643ffc4d60ab657aaa1718cc32>
+    <p43f7bb208e443c9b50eb304fe6606a3 xmlns="d95a5b16-1b8d-4c7c-9ebf-89c0983b6970">
+      <Terms xmlns="http://schemas.microsoft.com/office/infopath/2007/PartnerControls"/>
+    </p43f7bb208e443c9b50eb304fe6606a3>
+    <TaxCatchAll xmlns="d95a5b16-1b8d-4c7c-9ebf-89c0983b6970"/>
+    <h4c66fbf292e4125b0e390af25f11c04 xmlns="d95a5b16-1b8d-4c7c-9ebf-89c0983b6970">
+      <Terms xmlns="http://schemas.microsoft.com/office/infopath/2007/PartnerControls"/>
+    </h4c66fbf292e4125b0e390af25f11c04>
+    <eafb632c3f5c40ba98242be6bbd6bb17 xmlns="d95a5b16-1b8d-4c7c-9ebf-89c0983b6970">
+      <Terms xmlns="http://schemas.microsoft.com/office/infopath/2007/PartnerControls"/>
+    </eafb632c3f5c40ba98242be6bbd6bb17>
+  </documentManagement>
+</p:properties>
+</file>
+
+<file path=customXml/item3.xml><?xml version="1.0" encoding="utf-8"?>
+<?mso-contentType ?>
+<FormTemplates xmlns="http://schemas.microsoft.com/sharepoint/v3/contenttype/forms">
+  <Display>DocumentLibraryForm</Display>
+  <Edit>DocumentLibraryForm</Edit>
+  <New>DocumentLibraryForm</New>
+</FormTemplates>
+</file>
+
 <file path=customXml/item4.xml><?xml version="1.0" encoding="utf-8"?>
 <?mso-contentType ?>
 <spe:Receivers xmlns:spe="http://schemas.microsoft.com/sharepoint/events">
@@ -42694,9 +44514,20 @@
 </file>
 
 <file path=customXml/itemProps1.xml><?xml version="1.0" encoding="utf-8"?>
-<ds:datastoreItem xmlns:ds="http://schemas.openxmlformats.org/officeDocument/2006/customXml" ds:itemID="{ADA5D674-9920-4D2F-B065-BC24FD29F86D}">
+<ds:datastoreItem xmlns:ds="http://schemas.openxmlformats.org/officeDocument/2006/customXml" ds:itemID="{6F2C6FE6-5625-438C-ACCA-347FE9C06C3F}">
   <ds:schemaRefs>
-    <ds:schemaRef ds:uri="http://schemas.microsoft.com/sharepoint/v3/contenttype/forms"/>
+    <ds:schemaRef ds:uri="http://schemas.microsoft.com/office/2006/metadata/contentType"/>
+    <ds:schemaRef ds:uri="http://schemas.microsoft.com/office/2006/metadata/properties/metaAttributes"/>
+    <ds:schemaRef ds:uri="http://www.w3.org/2001/XMLSchema"/>
+    <ds:schemaRef ds:uri="http://schemas.microsoft.com/office/2006/metadata/properties"/>
+    <ds:schemaRef ds:uri="http://schemas.microsoft.com/sharepoint/v3"/>
+    <ds:schemaRef ds:uri="d95a5b16-1b8d-4c7c-9ebf-89c0983b6970"/>
+    <ds:schemaRef ds:uri="http://schemas.microsoft.com/office/2006/documentManagement/types"/>
+    <ds:schemaRef ds:uri="http://schemas.microsoft.com/office/infopath/2007/PartnerControls"/>
+    <ds:schemaRef ds:uri="http://schemas.openxmlformats.org/package/2006/metadata/core-properties"/>
+    <ds:schemaRef ds:uri="http://purl.org/dc/elements/1.1/"/>
+    <ds:schemaRef ds:uri="http://purl.org/dc/terms/"/>
+    <ds:schemaRef ds:uri="http://schemas.microsoft.com/internal/obd"/>
   </ds:schemaRefs>
 </ds:datastoreItem>
 </file>
@@ -42719,20 +44550,9 @@
 </file>
 
 <file path=customXml/itemProps3.xml><?xml version="1.0" encoding="utf-8"?>
-<ds:datastoreItem xmlns:ds="http://schemas.openxmlformats.org/officeDocument/2006/customXml" ds:itemID="{6F2C6FE6-5625-438C-ACCA-347FE9C06C3F}">
+<ds:datastoreItem xmlns:ds="http://schemas.openxmlformats.org/officeDocument/2006/customXml" ds:itemID="{ADA5D674-9920-4D2F-B065-BC24FD29F86D}">
   <ds:schemaRefs>
-    <ds:schemaRef ds:uri="http://schemas.microsoft.com/office/2006/metadata/contentType"/>
-    <ds:schemaRef ds:uri="http://schemas.microsoft.com/office/2006/metadata/properties/metaAttributes"/>
-    <ds:schemaRef ds:uri="http://www.w3.org/2001/XMLSchema"/>
-    <ds:schemaRef ds:uri="http://schemas.microsoft.com/office/2006/metadata/properties"/>
-    <ds:schemaRef ds:uri="http://schemas.microsoft.com/sharepoint/v3"/>
-    <ds:schemaRef ds:uri="d95a5b16-1b8d-4c7c-9ebf-89c0983b6970"/>
-    <ds:schemaRef ds:uri="http://schemas.microsoft.com/office/2006/documentManagement/types"/>
-    <ds:schemaRef ds:uri="http://schemas.microsoft.com/office/infopath/2007/PartnerControls"/>
-    <ds:schemaRef ds:uri="http://schemas.openxmlformats.org/package/2006/metadata/core-properties"/>
-    <ds:schemaRef ds:uri="http://purl.org/dc/elements/1.1/"/>
-    <ds:schemaRef ds:uri="http://purl.org/dc/terms/"/>
-    <ds:schemaRef ds:uri="http://schemas.microsoft.com/internal/obd"/>
+    <ds:schemaRef ds:uri="http://schemas.microsoft.com/sharepoint/v3/contenttype/forms"/>
   </ds:schemaRefs>
 </ds:datastoreItem>
 </file>

</xml_diff>